<commit_message>
MEDC_DE October 2019 Training
</commit_message>
<xml_diff>
--- a/SMART on FHIR Primer.pptx
+++ b/SMART on FHIR Primer.pptx
@@ -151,6 +151,35 @@
 </p:cmAuthorLst>
 </file>
 
+<file path=ppt/changesInfos/changesInfo1.xml><?xml version="1.0" encoding="utf-8"?>
+<pc:chgInfo xmlns:a="http://schemas.openxmlformats.org/drawingml/2006/main" xmlns:r="http://schemas.openxmlformats.org/officeDocument/2006/relationships" xmlns:ac="http://schemas.microsoft.com/office/drawing/2013/main/command" xmlns:pc="http://schemas.microsoft.com/office/powerpoint/2013/main/command">
+  <pc:docChgLst>
+    <pc:chgData name="Heits,Brian" userId="4566fefd-61b7-4c5a-b683-1c8fdafc2832" providerId="ADAL" clId="{61AA512D-9A6D-49E7-8225-531BEBFB3364}"/>
+    <pc:docChg chg="custSel modSld">
+      <pc:chgData name="Heits,Brian" userId="4566fefd-61b7-4c5a-b683-1c8fdafc2832" providerId="ADAL" clId="{61AA512D-9A6D-49E7-8225-531BEBFB3364}" dt="2019-10-15T00:14:29.341" v="23" actId="20577"/>
+      <pc:docMkLst>
+        <pc:docMk/>
+      </pc:docMkLst>
+      <pc:sldChg chg="modSp">
+        <pc:chgData name="Heits,Brian" userId="4566fefd-61b7-4c5a-b683-1c8fdafc2832" providerId="ADAL" clId="{61AA512D-9A6D-49E7-8225-531BEBFB3364}" dt="2019-10-15T00:14:29.341" v="23" actId="20577"/>
+        <pc:sldMkLst>
+          <pc:docMk/>
+          <pc:sldMk cId="579498076" sldId="317"/>
+        </pc:sldMkLst>
+        <pc:spChg chg="mod">
+          <ac:chgData name="Heits,Brian" userId="4566fefd-61b7-4c5a-b683-1c8fdafc2832" providerId="ADAL" clId="{61AA512D-9A6D-49E7-8225-531BEBFB3364}" dt="2019-10-15T00:14:29.341" v="23" actId="20577"/>
+          <ac:spMkLst>
+            <pc:docMk/>
+            <pc:sldMk cId="579498076" sldId="317"/>
+            <ac:spMk id="4" creationId="{00000000-0000-0000-0000-000000000000}"/>
+          </ac:spMkLst>
+        </pc:spChg>
+      </pc:sldChg>
+    </pc:docChg>
+  </pc:docChgLst>
+</pc:chgInfo>
+</file>
+
 <file path=ppt/comments/comment1.xml><?xml version="1.0" encoding="utf-8"?>
 <p:cmLst xmlns:a="http://schemas.openxmlformats.org/drawingml/2006/main" xmlns:r="http://schemas.openxmlformats.org/officeDocument/2006/relationships" xmlns:p="http://schemas.openxmlformats.org/presentationml/2006/main">
   <p:cm authorId="1" dt="2014-08-25T11:42:53.754" idx="2">
@@ -242,7 +271,7 @@
           <a:p>
             <a:fld id="{4031681A-4B84-4DE8-A5EF-A885124D351C}" type="datetimeFigureOut">
               <a:rPr lang="en-US" smtClean="0"/>
-              <a:t>7/11/2019</a:t>
+              <a:t>10/14/2019</a:t>
             </a:fld>
             <a:endParaRPr lang="en-US"/>
           </a:p>
@@ -836,7 +865,7 @@
           <a:p>
             <a:fld id="{DEA2229F-D951-4A8F-BA2A-3B6A0B3F46E2}" type="datetimeFigureOut">
               <a:rPr lang="en-US" smtClean="0"/>
-              <a:t>7/11/2019</a:t>
+              <a:t>10/14/2019</a:t>
             </a:fld>
             <a:endParaRPr lang="en-US"/>
           </a:p>
@@ -1004,7 +1033,7 @@
           <a:p>
             <a:fld id="{DEA2229F-D951-4A8F-BA2A-3B6A0B3F46E2}" type="datetimeFigureOut">
               <a:rPr lang="en-US" smtClean="0"/>
-              <a:t>7/11/2019</a:t>
+              <a:t>10/14/2019</a:t>
             </a:fld>
             <a:endParaRPr lang="en-US"/>
           </a:p>
@@ -1182,7 +1211,7 @@
           <a:p>
             <a:fld id="{DEA2229F-D951-4A8F-BA2A-3B6A0B3F46E2}" type="datetimeFigureOut">
               <a:rPr lang="en-US" smtClean="0"/>
-              <a:t>7/11/2019</a:t>
+              <a:t>10/14/2019</a:t>
             </a:fld>
             <a:endParaRPr lang="en-US"/>
           </a:p>
@@ -1638,7 +1667,7 @@
           <a:p>
             <a:fld id="{DEA2229F-D951-4A8F-BA2A-3B6A0B3F46E2}" type="datetimeFigureOut">
               <a:rPr lang="en-US" smtClean="0"/>
-              <a:t>7/11/2019</a:t>
+              <a:t>10/14/2019</a:t>
             </a:fld>
             <a:endParaRPr lang="en-US"/>
           </a:p>
@@ -1883,7 +1912,7 @@
           <a:p>
             <a:fld id="{DEA2229F-D951-4A8F-BA2A-3B6A0B3F46E2}" type="datetimeFigureOut">
               <a:rPr lang="en-US" smtClean="0"/>
-              <a:t>7/11/2019</a:t>
+              <a:t>10/14/2019</a:t>
             </a:fld>
             <a:endParaRPr lang="en-US"/>
           </a:p>
@@ -2112,7 +2141,7 @@
           <a:p>
             <a:fld id="{DEA2229F-D951-4A8F-BA2A-3B6A0B3F46E2}" type="datetimeFigureOut">
               <a:rPr lang="en-US" smtClean="0"/>
-              <a:t>7/11/2019</a:t>
+              <a:t>10/14/2019</a:t>
             </a:fld>
             <a:endParaRPr lang="en-US"/>
           </a:p>
@@ -2476,7 +2505,7 @@
           <a:p>
             <a:fld id="{DEA2229F-D951-4A8F-BA2A-3B6A0B3F46E2}" type="datetimeFigureOut">
               <a:rPr lang="en-US" smtClean="0"/>
-              <a:t>7/11/2019</a:t>
+              <a:t>10/14/2019</a:t>
             </a:fld>
             <a:endParaRPr lang="en-US"/>
           </a:p>
@@ -2593,7 +2622,7 @@
           <a:p>
             <a:fld id="{DEA2229F-D951-4A8F-BA2A-3B6A0B3F46E2}" type="datetimeFigureOut">
               <a:rPr lang="en-US" smtClean="0"/>
-              <a:t>7/11/2019</a:t>
+              <a:t>10/14/2019</a:t>
             </a:fld>
             <a:endParaRPr lang="en-US"/>
           </a:p>
@@ -2688,7 +2717,7 @@
           <a:p>
             <a:fld id="{DEA2229F-D951-4A8F-BA2A-3B6A0B3F46E2}" type="datetimeFigureOut">
               <a:rPr lang="en-US" smtClean="0"/>
-              <a:t>7/11/2019</a:t>
+              <a:t>10/14/2019</a:t>
             </a:fld>
             <a:endParaRPr lang="en-US"/>
           </a:p>
@@ -2963,7 +2992,7 @@
           <a:p>
             <a:fld id="{DEA2229F-D951-4A8F-BA2A-3B6A0B3F46E2}" type="datetimeFigureOut">
               <a:rPr lang="en-US" smtClean="0"/>
-              <a:t>7/11/2019</a:t>
+              <a:t>10/14/2019</a:t>
             </a:fld>
             <a:endParaRPr lang="en-US"/>
           </a:p>
@@ -3215,7 +3244,7 @@
           <a:p>
             <a:fld id="{DEA2229F-D951-4A8F-BA2A-3B6A0B3F46E2}" type="datetimeFigureOut">
               <a:rPr lang="en-US" smtClean="0"/>
-              <a:t>7/11/2019</a:t>
+              <a:t>10/14/2019</a:t>
             </a:fld>
             <a:endParaRPr lang="en-US"/>
           </a:p>
@@ -3426,7 +3455,7 @@
           <a:p>
             <a:fld id="{DEA2229F-D951-4A8F-BA2A-3B6A0B3F46E2}" type="datetimeFigureOut">
               <a:rPr lang="en-US" smtClean="0"/>
-              <a:t>7/11/2019</a:t>
+              <a:t>10/14/2019</a:t>
             </a:fld>
             <a:endParaRPr lang="en-US"/>
           </a:p>
@@ -3854,7 +3883,7 @@
           <a:p>
             <a:r>
               <a:rPr lang="en-US" dirty="0"/>
-              <a:t>Brian Heits	</a:t>
+              <a:t>Brian Heits</a:t>
             </a:r>
           </a:p>
         </p:txBody>
@@ -3882,6 +3911,49 @@
             <a:r>
               <a:rPr lang="en-US" dirty="0"/>
               <a:t>Associate Lead Software Engineer – Edge Professional Services</a:t>
+            </a:r>
+          </a:p>
+        </p:txBody>
+      </p:sp>
+      <p:sp>
+        <p:nvSpPr>
+          <p:cNvPr id="4" name="Text Placeholder 3"/>
+          <p:cNvSpPr>
+            <a:spLocks noGrp="1"/>
+          </p:cNvSpPr>
+          <p:nvPr>
+            <p:ph type="body" sz="quarter" idx="13"/>
+          </p:nvPr>
+        </p:nvSpPr>
+        <p:spPr>
+          <a:xfrm>
+            <a:off x="769939" y="6024556"/>
+            <a:ext cx="7397751" cy="287257"/>
+          </a:xfrm>
+        </p:spPr>
+        <p:txBody>
+          <a:bodyPr/>
+          <a:lstStyle/>
+          <a:p>
+            <a:r>
+              <a:rPr lang="en-US" dirty="0"/>
+              <a:t>October 15</a:t>
+            </a:r>
+            <a:r>
+              <a:rPr lang="en-US" baseline="30000" dirty="0"/>
+              <a:t>th</a:t>
+            </a:r>
+            <a:r>
+              <a:rPr lang="en-US" dirty="0"/>
+              <a:t> – 17</a:t>
+            </a:r>
+            <a:r>
+              <a:rPr lang="en-US" baseline="30000" dirty="0"/>
+              <a:t>th</a:t>
+            </a:r>
+            <a:r>
+              <a:rPr lang="en-US" dirty="0"/>
+              <a:t>, 2019</a:t>
             </a:r>
           </a:p>
         </p:txBody>

</xml_diff>

<commit_message>
April 2022 - CHOC_CA Training
</commit_message>
<xml_diff>
--- a/SMART on FHIR Primer.pptx
+++ b/SMART on FHIR Primer.pptx
@@ -242,7 +242,7 @@
           <a:p>
             <a:fld id="{4031681A-4B84-4DE8-A5EF-A885124D351C}" type="datetimeFigureOut">
               <a:rPr lang="en-US" smtClean="0"/>
-              <a:t>5/31/2021</a:t>
+              <a:t>4/26/2022</a:t>
             </a:fld>
             <a:endParaRPr lang="en-US"/>
           </a:p>
@@ -836,7 +836,7 @@
           <a:p>
             <a:fld id="{DEA2229F-D951-4A8F-BA2A-3B6A0B3F46E2}" type="datetimeFigureOut">
               <a:rPr lang="en-US" smtClean="0"/>
-              <a:t>5/31/2021</a:t>
+              <a:t>4/26/2022</a:t>
             </a:fld>
             <a:endParaRPr lang="en-US"/>
           </a:p>
@@ -1004,7 +1004,7 @@
           <a:p>
             <a:fld id="{DEA2229F-D951-4A8F-BA2A-3B6A0B3F46E2}" type="datetimeFigureOut">
               <a:rPr lang="en-US" smtClean="0"/>
-              <a:t>5/31/2021</a:t>
+              <a:t>4/26/2022</a:t>
             </a:fld>
             <a:endParaRPr lang="en-US"/>
           </a:p>
@@ -1182,7 +1182,7 @@
           <a:p>
             <a:fld id="{DEA2229F-D951-4A8F-BA2A-3B6A0B3F46E2}" type="datetimeFigureOut">
               <a:rPr lang="en-US" smtClean="0"/>
-              <a:t>5/31/2021</a:t>
+              <a:t>4/26/2022</a:t>
             </a:fld>
             <a:endParaRPr lang="en-US"/>
           </a:p>
@@ -1638,7 +1638,7 @@
           <a:p>
             <a:fld id="{DEA2229F-D951-4A8F-BA2A-3B6A0B3F46E2}" type="datetimeFigureOut">
               <a:rPr lang="en-US" smtClean="0"/>
-              <a:t>5/31/2021</a:t>
+              <a:t>4/26/2022</a:t>
             </a:fld>
             <a:endParaRPr lang="en-US"/>
           </a:p>
@@ -1883,7 +1883,7 @@
           <a:p>
             <a:fld id="{DEA2229F-D951-4A8F-BA2A-3B6A0B3F46E2}" type="datetimeFigureOut">
               <a:rPr lang="en-US" smtClean="0"/>
-              <a:t>5/31/2021</a:t>
+              <a:t>4/26/2022</a:t>
             </a:fld>
             <a:endParaRPr lang="en-US"/>
           </a:p>
@@ -2112,7 +2112,7 @@
           <a:p>
             <a:fld id="{DEA2229F-D951-4A8F-BA2A-3B6A0B3F46E2}" type="datetimeFigureOut">
               <a:rPr lang="en-US" smtClean="0"/>
-              <a:t>5/31/2021</a:t>
+              <a:t>4/26/2022</a:t>
             </a:fld>
             <a:endParaRPr lang="en-US"/>
           </a:p>
@@ -2476,7 +2476,7 @@
           <a:p>
             <a:fld id="{DEA2229F-D951-4A8F-BA2A-3B6A0B3F46E2}" type="datetimeFigureOut">
               <a:rPr lang="en-US" smtClean="0"/>
-              <a:t>5/31/2021</a:t>
+              <a:t>4/26/2022</a:t>
             </a:fld>
             <a:endParaRPr lang="en-US"/>
           </a:p>
@@ -2593,7 +2593,7 @@
           <a:p>
             <a:fld id="{DEA2229F-D951-4A8F-BA2A-3B6A0B3F46E2}" type="datetimeFigureOut">
               <a:rPr lang="en-US" smtClean="0"/>
-              <a:t>5/31/2021</a:t>
+              <a:t>4/26/2022</a:t>
             </a:fld>
             <a:endParaRPr lang="en-US"/>
           </a:p>
@@ -2688,7 +2688,7 @@
           <a:p>
             <a:fld id="{DEA2229F-D951-4A8F-BA2A-3B6A0B3F46E2}" type="datetimeFigureOut">
               <a:rPr lang="en-US" smtClean="0"/>
-              <a:t>5/31/2021</a:t>
+              <a:t>4/26/2022</a:t>
             </a:fld>
             <a:endParaRPr lang="en-US"/>
           </a:p>
@@ -2963,7 +2963,7 @@
           <a:p>
             <a:fld id="{DEA2229F-D951-4A8F-BA2A-3B6A0B3F46E2}" type="datetimeFigureOut">
               <a:rPr lang="en-US" smtClean="0"/>
-              <a:t>5/31/2021</a:t>
+              <a:t>4/26/2022</a:t>
             </a:fld>
             <a:endParaRPr lang="en-US"/>
           </a:p>
@@ -3215,7 +3215,7 @@
           <a:p>
             <a:fld id="{DEA2229F-D951-4A8F-BA2A-3B6A0B3F46E2}" type="datetimeFigureOut">
               <a:rPr lang="en-US" smtClean="0"/>
-              <a:t>5/31/2021</a:t>
+              <a:t>4/26/2022</a:t>
             </a:fld>
             <a:endParaRPr lang="en-US"/>
           </a:p>
@@ -3426,7 +3426,7 @@
           <a:p>
             <a:fld id="{DEA2229F-D951-4A8F-BA2A-3B6A0B3F46E2}" type="datetimeFigureOut">
               <a:rPr lang="en-US" smtClean="0"/>
-              <a:t>5/31/2021</a:t>
+              <a:t>4/26/2022</a:t>
             </a:fld>
             <a:endParaRPr lang="en-US"/>
           </a:p>
@@ -3881,7 +3881,7 @@
           <a:p>
             <a:r>
               <a:rPr lang="en-US" dirty="0"/>
-              <a:t>Lead Software Engineer – Edge Professional Services</a:t>
+              <a:t>Associate Lead Software Engineer – Edge Professional Services</a:t>
             </a:r>
           </a:p>
         </p:txBody>
@@ -3908,23 +3908,7 @@
           <a:p>
             <a:r>
               <a:rPr lang="en-US" dirty="0"/>
-              <a:t>June 1</a:t>
-            </a:r>
-            <a:r>
-              <a:rPr lang="en-US" baseline="30000" dirty="0"/>
-              <a:t>st</a:t>
-            </a:r>
-            <a:r>
-              <a:rPr lang="en-US" dirty="0"/>
-              <a:t> – 4</a:t>
-            </a:r>
-            <a:r>
-              <a:rPr lang="en-US" baseline="30000" dirty="0"/>
-              <a:t>th</a:t>
-            </a:r>
-            <a:r>
-              <a:rPr lang="en-US" dirty="0"/>
-              <a:t>, 2021</a:t>
+              <a:t>April 28th, 2022</a:t>
             </a:r>
           </a:p>
         </p:txBody>
@@ -5533,13 +5517,13 @@
                 <a:latin typeface="Calibri-Light"/>
                 <a:hlinkClick r:id="rId6"/>
               </a:rPr>
-              <a:t>chat.fhir.org</a:t>
+              <a:t>chat.fhir.org </a:t>
             </a:r>
             <a:r>
               <a:rPr lang="en-US" sz="3600" dirty="0">
                 <a:latin typeface="Calibri-Light"/>
               </a:rPr>
-              <a:t> | </a:t>
+              <a:t>| </a:t>
             </a:r>
             <a:r>
               <a:rPr lang="en-US" sz="3600" dirty="0">

</xml_diff>

<commit_message>
June 2022 - NIRH_CD Training
</commit_message>
<xml_diff>
--- a/SMART on FHIR Primer.pptx
+++ b/SMART on FHIR Primer.pptx
@@ -242,7 +242,7 @@
           <a:p>
             <a:fld id="{4031681A-4B84-4DE8-A5EF-A885124D351C}" type="datetimeFigureOut">
               <a:rPr lang="en-US" smtClean="0"/>
-              <a:t>4/26/2022</a:t>
+              <a:t>6/25/2022</a:t>
             </a:fld>
             <a:endParaRPr lang="en-US"/>
           </a:p>
@@ -836,7 +836,7 @@
           <a:p>
             <a:fld id="{DEA2229F-D951-4A8F-BA2A-3B6A0B3F46E2}" type="datetimeFigureOut">
               <a:rPr lang="en-US" smtClean="0"/>
-              <a:t>4/26/2022</a:t>
+              <a:t>6/25/2022</a:t>
             </a:fld>
             <a:endParaRPr lang="en-US"/>
           </a:p>
@@ -1004,7 +1004,7 @@
           <a:p>
             <a:fld id="{DEA2229F-D951-4A8F-BA2A-3B6A0B3F46E2}" type="datetimeFigureOut">
               <a:rPr lang="en-US" smtClean="0"/>
-              <a:t>4/26/2022</a:t>
+              <a:t>6/25/2022</a:t>
             </a:fld>
             <a:endParaRPr lang="en-US"/>
           </a:p>
@@ -1182,7 +1182,7 @@
           <a:p>
             <a:fld id="{DEA2229F-D951-4A8F-BA2A-3B6A0B3F46E2}" type="datetimeFigureOut">
               <a:rPr lang="en-US" smtClean="0"/>
-              <a:t>4/26/2022</a:t>
+              <a:t>6/25/2022</a:t>
             </a:fld>
             <a:endParaRPr lang="en-US"/>
           </a:p>
@@ -1638,7 +1638,7 @@
           <a:p>
             <a:fld id="{DEA2229F-D951-4A8F-BA2A-3B6A0B3F46E2}" type="datetimeFigureOut">
               <a:rPr lang="en-US" smtClean="0"/>
-              <a:t>4/26/2022</a:t>
+              <a:t>6/25/2022</a:t>
             </a:fld>
             <a:endParaRPr lang="en-US"/>
           </a:p>
@@ -1883,7 +1883,7 @@
           <a:p>
             <a:fld id="{DEA2229F-D951-4A8F-BA2A-3B6A0B3F46E2}" type="datetimeFigureOut">
               <a:rPr lang="en-US" smtClean="0"/>
-              <a:t>4/26/2022</a:t>
+              <a:t>6/25/2022</a:t>
             </a:fld>
             <a:endParaRPr lang="en-US"/>
           </a:p>
@@ -2112,7 +2112,7 @@
           <a:p>
             <a:fld id="{DEA2229F-D951-4A8F-BA2A-3B6A0B3F46E2}" type="datetimeFigureOut">
               <a:rPr lang="en-US" smtClean="0"/>
-              <a:t>4/26/2022</a:t>
+              <a:t>6/25/2022</a:t>
             </a:fld>
             <a:endParaRPr lang="en-US"/>
           </a:p>
@@ -2476,7 +2476,7 @@
           <a:p>
             <a:fld id="{DEA2229F-D951-4A8F-BA2A-3B6A0B3F46E2}" type="datetimeFigureOut">
               <a:rPr lang="en-US" smtClean="0"/>
-              <a:t>4/26/2022</a:t>
+              <a:t>6/25/2022</a:t>
             </a:fld>
             <a:endParaRPr lang="en-US"/>
           </a:p>
@@ -2593,7 +2593,7 @@
           <a:p>
             <a:fld id="{DEA2229F-D951-4A8F-BA2A-3B6A0B3F46E2}" type="datetimeFigureOut">
               <a:rPr lang="en-US" smtClean="0"/>
-              <a:t>4/26/2022</a:t>
+              <a:t>6/25/2022</a:t>
             </a:fld>
             <a:endParaRPr lang="en-US"/>
           </a:p>
@@ -2688,7 +2688,7 @@
           <a:p>
             <a:fld id="{DEA2229F-D951-4A8F-BA2A-3B6A0B3F46E2}" type="datetimeFigureOut">
               <a:rPr lang="en-US" smtClean="0"/>
-              <a:t>4/26/2022</a:t>
+              <a:t>6/25/2022</a:t>
             </a:fld>
             <a:endParaRPr lang="en-US"/>
           </a:p>
@@ -2963,7 +2963,7 @@
           <a:p>
             <a:fld id="{DEA2229F-D951-4A8F-BA2A-3B6A0B3F46E2}" type="datetimeFigureOut">
               <a:rPr lang="en-US" smtClean="0"/>
-              <a:t>4/26/2022</a:t>
+              <a:t>6/25/2022</a:t>
             </a:fld>
             <a:endParaRPr lang="en-US"/>
           </a:p>
@@ -3215,7 +3215,7 @@
           <a:p>
             <a:fld id="{DEA2229F-D951-4A8F-BA2A-3B6A0B3F46E2}" type="datetimeFigureOut">
               <a:rPr lang="en-US" smtClean="0"/>
-              <a:t>4/26/2022</a:t>
+              <a:t>6/25/2022</a:t>
             </a:fld>
             <a:endParaRPr lang="en-US"/>
           </a:p>
@@ -3426,7 +3426,7 @@
           <a:p>
             <a:fld id="{DEA2229F-D951-4A8F-BA2A-3B6A0B3F46E2}" type="datetimeFigureOut">
               <a:rPr lang="en-US" smtClean="0"/>
-              <a:t>4/26/2022</a:t>
+              <a:t>6/25/2022</a:t>
             </a:fld>
             <a:endParaRPr lang="en-US"/>
           </a:p>
@@ -3908,7 +3908,7 @@
           <a:p>
             <a:r>
               <a:rPr lang="en-US" dirty="0"/>
-              <a:t>April 28th, 2022</a:t>
+              <a:t>June 28th, 2022</a:t>
             </a:r>
           </a:p>
         </p:txBody>

</xml_diff>

<commit_message>
NIRH_CD July 2022 Updates
</commit_message>
<xml_diff>
--- a/SMART on FHIR Primer.pptx
+++ b/SMART on FHIR Primer.pptx
@@ -242,7 +242,7 @@
           <a:p>
             <a:fld id="{4031681A-4B84-4DE8-A5EF-A885124D351C}" type="datetimeFigureOut">
               <a:rPr lang="en-US" smtClean="0"/>
-              <a:t>6/25/2022</a:t>
+              <a:t>7/17/2022</a:t>
             </a:fld>
             <a:endParaRPr lang="en-US"/>
           </a:p>
@@ -836,7 +836,7 @@
           <a:p>
             <a:fld id="{DEA2229F-D951-4A8F-BA2A-3B6A0B3F46E2}" type="datetimeFigureOut">
               <a:rPr lang="en-US" smtClean="0"/>
-              <a:t>6/25/2022</a:t>
+              <a:t>7/17/2022</a:t>
             </a:fld>
             <a:endParaRPr lang="en-US"/>
           </a:p>
@@ -1004,7 +1004,7 @@
           <a:p>
             <a:fld id="{DEA2229F-D951-4A8F-BA2A-3B6A0B3F46E2}" type="datetimeFigureOut">
               <a:rPr lang="en-US" smtClean="0"/>
-              <a:t>6/25/2022</a:t>
+              <a:t>7/17/2022</a:t>
             </a:fld>
             <a:endParaRPr lang="en-US"/>
           </a:p>
@@ -1182,7 +1182,7 @@
           <a:p>
             <a:fld id="{DEA2229F-D951-4A8F-BA2A-3B6A0B3F46E2}" type="datetimeFigureOut">
               <a:rPr lang="en-US" smtClean="0"/>
-              <a:t>6/25/2022</a:t>
+              <a:t>7/17/2022</a:t>
             </a:fld>
             <a:endParaRPr lang="en-US"/>
           </a:p>
@@ -1638,7 +1638,7 @@
           <a:p>
             <a:fld id="{DEA2229F-D951-4A8F-BA2A-3B6A0B3F46E2}" type="datetimeFigureOut">
               <a:rPr lang="en-US" smtClean="0"/>
-              <a:t>6/25/2022</a:t>
+              <a:t>7/17/2022</a:t>
             </a:fld>
             <a:endParaRPr lang="en-US"/>
           </a:p>
@@ -1883,7 +1883,7 @@
           <a:p>
             <a:fld id="{DEA2229F-D951-4A8F-BA2A-3B6A0B3F46E2}" type="datetimeFigureOut">
               <a:rPr lang="en-US" smtClean="0"/>
-              <a:t>6/25/2022</a:t>
+              <a:t>7/17/2022</a:t>
             </a:fld>
             <a:endParaRPr lang="en-US"/>
           </a:p>
@@ -2112,7 +2112,7 @@
           <a:p>
             <a:fld id="{DEA2229F-D951-4A8F-BA2A-3B6A0B3F46E2}" type="datetimeFigureOut">
               <a:rPr lang="en-US" smtClean="0"/>
-              <a:t>6/25/2022</a:t>
+              <a:t>7/17/2022</a:t>
             </a:fld>
             <a:endParaRPr lang="en-US"/>
           </a:p>
@@ -2476,7 +2476,7 @@
           <a:p>
             <a:fld id="{DEA2229F-D951-4A8F-BA2A-3B6A0B3F46E2}" type="datetimeFigureOut">
               <a:rPr lang="en-US" smtClean="0"/>
-              <a:t>6/25/2022</a:t>
+              <a:t>7/17/2022</a:t>
             </a:fld>
             <a:endParaRPr lang="en-US"/>
           </a:p>
@@ -2593,7 +2593,7 @@
           <a:p>
             <a:fld id="{DEA2229F-D951-4A8F-BA2A-3B6A0B3F46E2}" type="datetimeFigureOut">
               <a:rPr lang="en-US" smtClean="0"/>
-              <a:t>6/25/2022</a:t>
+              <a:t>7/17/2022</a:t>
             </a:fld>
             <a:endParaRPr lang="en-US"/>
           </a:p>
@@ -2688,7 +2688,7 @@
           <a:p>
             <a:fld id="{DEA2229F-D951-4A8F-BA2A-3B6A0B3F46E2}" type="datetimeFigureOut">
               <a:rPr lang="en-US" smtClean="0"/>
-              <a:t>6/25/2022</a:t>
+              <a:t>7/17/2022</a:t>
             </a:fld>
             <a:endParaRPr lang="en-US"/>
           </a:p>
@@ -2963,7 +2963,7 @@
           <a:p>
             <a:fld id="{DEA2229F-D951-4A8F-BA2A-3B6A0B3F46E2}" type="datetimeFigureOut">
               <a:rPr lang="en-US" smtClean="0"/>
-              <a:t>6/25/2022</a:t>
+              <a:t>7/17/2022</a:t>
             </a:fld>
             <a:endParaRPr lang="en-US"/>
           </a:p>
@@ -3215,7 +3215,7 @@
           <a:p>
             <a:fld id="{DEA2229F-D951-4A8F-BA2A-3B6A0B3F46E2}" type="datetimeFigureOut">
               <a:rPr lang="en-US" smtClean="0"/>
-              <a:t>6/25/2022</a:t>
+              <a:t>7/17/2022</a:t>
             </a:fld>
             <a:endParaRPr lang="en-US"/>
           </a:p>
@@ -3426,7 +3426,7 @@
           <a:p>
             <a:fld id="{DEA2229F-D951-4A8F-BA2A-3B6A0B3F46E2}" type="datetimeFigureOut">
               <a:rPr lang="en-US" smtClean="0"/>
-              <a:t>6/25/2022</a:t>
+              <a:t>7/17/2022</a:t>
             </a:fld>
             <a:endParaRPr lang="en-US"/>
           </a:p>
@@ -3907,8 +3907,12 @@
           <a:lstStyle/>
           <a:p>
             <a:r>
+              <a:rPr lang="en-US"/>
+              <a:t>July 19th</a:t>
+            </a:r>
+            <a:r>
               <a:rPr lang="en-US" dirty="0"/>
-              <a:t>June 28th, 2022</a:t>
+              <a:t>, 2022</a:t>
             </a:r>
           </a:p>
         </p:txBody>

</xml_diff>

<commit_message>
VIHA_CD Training July 2022
</commit_message>
<xml_diff>
--- a/SMART on FHIR Primer.pptx
+++ b/SMART on FHIR Primer.pptx
@@ -242,7 +242,7 @@
           <a:p>
             <a:fld id="{4031681A-4B84-4DE8-A5EF-A885124D351C}" type="datetimeFigureOut">
               <a:rPr lang="en-US" smtClean="0"/>
-              <a:t>7/17/2022</a:t>
+              <a:t>7/24/2022</a:t>
             </a:fld>
             <a:endParaRPr lang="en-US"/>
           </a:p>
@@ -836,7 +836,7 @@
           <a:p>
             <a:fld id="{DEA2229F-D951-4A8F-BA2A-3B6A0B3F46E2}" type="datetimeFigureOut">
               <a:rPr lang="en-US" smtClean="0"/>
-              <a:t>7/17/2022</a:t>
+              <a:t>7/24/2022</a:t>
             </a:fld>
             <a:endParaRPr lang="en-US"/>
           </a:p>
@@ -1004,7 +1004,7 @@
           <a:p>
             <a:fld id="{DEA2229F-D951-4A8F-BA2A-3B6A0B3F46E2}" type="datetimeFigureOut">
               <a:rPr lang="en-US" smtClean="0"/>
-              <a:t>7/17/2022</a:t>
+              <a:t>7/24/2022</a:t>
             </a:fld>
             <a:endParaRPr lang="en-US"/>
           </a:p>
@@ -1182,7 +1182,7 @@
           <a:p>
             <a:fld id="{DEA2229F-D951-4A8F-BA2A-3B6A0B3F46E2}" type="datetimeFigureOut">
               <a:rPr lang="en-US" smtClean="0"/>
-              <a:t>7/17/2022</a:t>
+              <a:t>7/24/2022</a:t>
             </a:fld>
             <a:endParaRPr lang="en-US"/>
           </a:p>
@@ -1638,7 +1638,7 @@
           <a:p>
             <a:fld id="{DEA2229F-D951-4A8F-BA2A-3B6A0B3F46E2}" type="datetimeFigureOut">
               <a:rPr lang="en-US" smtClean="0"/>
-              <a:t>7/17/2022</a:t>
+              <a:t>7/24/2022</a:t>
             </a:fld>
             <a:endParaRPr lang="en-US"/>
           </a:p>
@@ -1883,7 +1883,7 @@
           <a:p>
             <a:fld id="{DEA2229F-D951-4A8F-BA2A-3B6A0B3F46E2}" type="datetimeFigureOut">
               <a:rPr lang="en-US" smtClean="0"/>
-              <a:t>7/17/2022</a:t>
+              <a:t>7/24/2022</a:t>
             </a:fld>
             <a:endParaRPr lang="en-US"/>
           </a:p>
@@ -2112,7 +2112,7 @@
           <a:p>
             <a:fld id="{DEA2229F-D951-4A8F-BA2A-3B6A0B3F46E2}" type="datetimeFigureOut">
               <a:rPr lang="en-US" smtClean="0"/>
-              <a:t>7/17/2022</a:t>
+              <a:t>7/24/2022</a:t>
             </a:fld>
             <a:endParaRPr lang="en-US"/>
           </a:p>
@@ -2476,7 +2476,7 @@
           <a:p>
             <a:fld id="{DEA2229F-D951-4A8F-BA2A-3B6A0B3F46E2}" type="datetimeFigureOut">
               <a:rPr lang="en-US" smtClean="0"/>
-              <a:t>7/17/2022</a:t>
+              <a:t>7/24/2022</a:t>
             </a:fld>
             <a:endParaRPr lang="en-US"/>
           </a:p>
@@ -2593,7 +2593,7 @@
           <a:p>
             <a:fld id="{DEA2229F-D951-4A8F-BA2A-3B6A0B3F46E2}" type="datetimeFigureOut">
               <a:rPr lang="en-US" smtClean="0"/>
-              <a:t>7/17/2022</a:t>
+              <a:t>7/24/2022</a:t>
             </a:fld>
             <a:endParaRPr lang="en-US"/>
           </a:p>
@@ -2688,7 +2688,7 @@
           <a:p>
             <a:fld id="{DEA2229F-D951-4A8F-BA2A-3B6A0B3F46E2}" type="datetimeFigureOut">
               <a:rPr lang="en-US" smtClean="0"/>
-              <a:t>7/17/2022</a:t>
+              <a:t>7/24/2022</a:t>
             </a:fld>
             <a:endParaRPr lang="en-US"/>
           </a:p>
@@ -2963,7 +2963,7 @@
           <a:p>
             <a:fld id="{DEA2229F-D951-4A8F-BA2A-3B6A0B3F46E2}" type="datetimeFigureOut">
               <a:rPr lang="en-US" smtClean="0"/>
-              <a:t>7/17/2022</a:t>
+              <a:t>7/24/2022</a:t>
             </a:fld>
             <a:endParaRPr lang="en-US"/>
           </a:p>
@@ -3215,7 +3215,7 @@
           <a:p>
             <a:fld id="{DEA2229F-D951-4A8F-BA2A-3B6A0B3F46E2}" type="datetimeFigureOut">
               <a:rPr lang="en-US" smtClean="0"/>
-              <a:t>7/17/2022</a:t>
+              <a:t>7/24/2022</a:t>
             </a:fld>
             <a:endParaRPr lang="en-US"/>
           </a:p>
@@ -3426,7 +3426,7 @@
           <a:p>
             <a:fld id="{DEA2229F-D951-4A8F-BA2A-3B6A0B3F46E2}" type="datetimeFigureOut">
               <a:rPr lang="en-US" smtClean="0"/>
-              <a:t>7/17/2022</a:t>
+              <a:t>7/24/2022</a:t>
             </a:fld>
             <a:endParaRPr lang="en-US"/>
           </a:p>
@@ -3908,7 +3908,7 @@
           <a:p>
             <a:r>
               <a:rPr lang="en-US"/>
-              <a:t>July 19th</a:t>
+              <a:t>July 26th</a:t>
             </a:r>
             <a:r>
               <a:rPr lang="en-US" dirty="0"/>

</xml_diff>

<commit_message>
NIRH_CD August 2022 Updates
</commit_message>
<xml_diff>
--- a/SMART on FHIR Primer.pptx
+++ b/SMART on FHIR Primer.pptx
@@ -242,7 +242,7 @@
           <a:p>
             <a:fld id="{4031681A-4B84-4DE8-A5EF-A885124D351C}" type="datetimeFigureOut">
               <a:rPr lang="en-US" smtClean="0"/>
-              <a:t>7/24/2022</a:t>
+              <a:t>8/28/2022</a:t>
             </a:fld>
             <a:endParaRPr lang="en-US"/>
           </a:p>
@@ -836,7 +836,7 @@
           <a:p>
             <a:fld id="{DEA2229F-D951-4A8F-BA2A-3B6A0B3F46E2}" type="datetimeFigureOut">
               <a:rPr lang="en-US" smtClean="0"/>
-              <a:t>7/24/2022</a:t>
+              <a:t>8/28/2022</a:t>
             </a:fld>
             <a:endParaRPr lang="en-US"/>
           </a:p>
@@ -1004,7 +1004,7 @@
           <a:p>
             <a:fld id="{DEA2229F-D951-4A8F-BA2A-3B6A0B3F46E2}" type="datetimeFigureOut">
               <a:rPr lang="en-US" smtClean="0"/>
-              <a:t>7/24/2022</a:t>
+              <a:t>8/28/2022</a:t>
             </a:fld>
             <a:endParaRPr lang="en-US"/>
           </a:p>
@@ -1182,7 +1182,7 @@
           <a:p>
             <a:fld id="{DEA2229F-D951-4A8F-BA2A-3B6A0B3F46E2}" type="datetimeFigureOut">
               <a:rPr lang="en-US" smtClean="0"/>
-              <a:t>7/24/2022</a:t>
+              <a:t>8/28/2022</a:t>
             </a:fld>
             <a:endParaRPr lang="en-US"/>
           </a:p>
@@ -1638,7 +1638,7 @@
           <a:p>
             <a:fld id="{DEA2229F-D951-4A8F-BA2A-3B6A0B3F46E2}" type="datetimeFigureOut">
               <a:rPr lang="en-US" smtClean="0"/>
-              <a:t>7/24/2022</a:t>
+              <a:t>8/28/2022</a:t>
             </a:fld>
             <a:endParaRPr lang="en-US"/>
           </a:p>
@@ -1883,7 +1883,7 @@
           <a:p>
             <a:fld id="{DEA2229F-D951-4A8F-BA2A-3B6A0B3F46E2}" type="datetimeFigureOut">
               <a:rPr lang="en-US" smtClean="0"/>
-              <a:t>7/24/2022</a:t>
+              <a:t>8/28/2022</a:t>
             </a:fld>
             <a:endParaRPr lang="en-US"/>
           </a:p>
@@ -2112,7 +2112,7 @@
           <a:p>
             <a:fld id="{DEA2229F-D951-4A8F-BA2A-3B6A0B3F46E2}" type="datetimeFigureOut">
               <a:rPr lang="en-US" smtClean="0"/>
-              <a:t>7/24/2022</a:t>
+              <a:t>8/28/2022</a:t>
             </a:fld>
             <a:endParaRPr lang="en-US"/>
           </a:p>
@@ -2476,7 +2476,7 @@
           <a:p>
             <a:fld id="{DEA2229F-D951-4A8F-BA2A-3B6A0B3F46E2}" type="datetimeFigureOut">
               <a:rPr lang="en-US" smtClean="0"/>
-              <a:t>7/24/2022</a:t>
+              <a:t>8/28/2022</a:t>
             </a:fld>
             <a:endParaRPr lang="en-US"/>
           </a:p>
@@ -2593,7 +2593,7 @@
           <a:p>
             <a:fld id="{DEA2229F-D951-4A8F-BA2A-3B6A0B3F46E2}" type="datetimeFigureOut">
               <a:rPr lang="en-US" smtClean="0"/>
-              <a:t>7/24/2022</a:t>
+              <a:t>8/28/2022</a:t>
             </a:fld>
             <a:endParaRPr lang="en-US"/>
           </a:p>
@@ -2688,7 +2688,7 @@
           <a:p>
             <a:fld id="{DEA2229F-D951-4A8F-BA2A-3B6A0B3F46E2}" type="datetimeFigureOut">
               <a:rPr lang="en-US" smtClean="0"/>
-              <a:t>7/24/2022</a:t>
+              <a:t>8/28/2022</a:t>
             </a:fld>
             <a:endParaRPr lang="en-US"/>
           </a:p>
@@ -2963,7 +2963,7 @@
           <a:p>
             <a:fld id="{DEA2229F-D951-4A8F-BA2A-3B6A0B3F46E2}" type="datetimeFigureOut">
               <a:rPr lang="en-US" smtClean="0"/>
-              <a:t>7/24/2022</a:t>
+              <a:t>8/28/2022</a:t>
             </a:fld>
             <a:endParaRPr lang="en-US"/>
           </a:p>
@@ -3215,7 +3215,7 @@
           <a:p>
             <a:fld id="{DEA2229F-D951-4A8F-BA2A-3B6A0B3F46E2}" type="datetimeFigureOut">
               <a:rPr lang="en-US" smtClean="0"/>
-              <a:t>7/24/2022</a:t>
+              <a:t>8/28/2022</a:t>
             </a:fld>
             <a:endParaRPr lang="en-US"/>
           </a:p>
@@ -3426,7 +3426,7 @@
           <a:p>
             <a:fld id="{DEA2229F-D951-4A8F-BA2A-3B6A0B3F46E2}" type="datetimeFigureOut">
               <a:rPr lang="en-US" smtClean="0"/>
-              <a:t>7/24/2022</a:t>
+              <a:t>8/28/2022</a:t>
             </a:fld>
             <a:endParaRPr lang="en-US"/>
           </a:p>
@@ -3907,12 +3907,8 @@
           <a:lstStyle/>
           <a:p>
             <a:r>
-              <a:rPr lang="en-US"/>
-              <a:t>July 26th</a:t>
-            </a:r>
-            <a:r>
               <a:rPr lang="en-US" dirty="0"/>
-              <a:t>, 2022</a:t>
+              <a:t>August 30th, 2022</a:t>
             </a:r>
           </a:p>
         </p:txBody>

</xml_diff>

<commit_message>
GBHS_CD February 2023 Updates
</commit_message>
<xml_diff>
--- a/SMART on FHIR Primer.pptx
+++ b/SMART on FHIR Primer.pptx
@@ -151,6 +151,35 @@
 </p:cmAuthorLst>
 </file>
 
+<file path=ppt/changesInfos/changesInfo1.xml><?xml version="1.0" encoding="utf-8"?>
+<pc:chgInfo xmlns:a="http://schemas.openxmlformats.org/drawingml/2006/main" xmlns:r="http://schemas.openxmlformats.org/officeDocument/2006/relationships" xmlns:ac="http://schemas.microsoft.com/office/drawing/2013/main/command" xmlns:pc="http://schemas.microsoft.com/office/powerpoint/2013/main/command">
+  <pc:docChgLst>
+    <pc:chgData name="Heits, Brian" userId="4566fefd-61b7-4c5a-b683-1c8fdafc2832" providerId="ADAL" clId="{EBB2509E-9158-48F4-B08F-3B146EDA1E91}"/>
+    <pc:docChg chg="modSld">
+      <pc:chgData name="Heits, Brian" userId="4566fefd-61b7-4c5a-b683-1c8fdafc2832" providerId="ADAL" clId="{EBB2509E-9158-48F4-B08F-3B146EDA1E91}" dt="2023-02-05T18:42:03.183" v="23" actId="20577"/>
+      <pc:docMkLst>
+        <pc:docMk/>
+      </pc:docMkLst>
+      <pc:sldChg chg="modSp mod">
+        <pc:chgData name="Heits, Brian" userId="4566fefd-61b7-4c5a-b683-1c8fdafc2832" providerId="ADAL" clId="{EBB2509E-9158-48F4-B08F-3B146EDA1E91}" dt="2023-02-05T18:42:03.183" v="23" actId="20577"/>
+        <pc:sldMkLst>
+          <pc:docMk/>
+          <pc:sldMk cId="579498076" sldId="317"/>
+        </pc:sldMkLst>
+        <pc:spChg chg="mod">
+          <ac:chgData name="Heits, Brian" userId="4566fefd-61b7-4c5a-b683-1c8fdafc2832" providerId="ADAL" clId="{EBB2509E-9158-48F4-B08F-3B146EDA1E91}" dt="2023-02-05T18:42:03.183" v="23" actId="20577"/>
+          <ac:spMkLst>
+            <pc:docMk/>
+            <pc:sldMk cId="579498076" sldId="317"/>
+            <ac:spMk id="4" creationId="{00000000-0000-0000-0000-000000000000}"/>
+          </ac:spMkLst>
+        </pc:spChg>
+      </pc:sldChg>
+    </pc:docChg>
+  </pc:docChgLst>
+</pc:chgInfo>
+</file>
+
 <file path=ppt/comments/comment1.xml><?xml version="1.0" encoding="utf-8"?>
 <p:cmLst xmlns:a="http://schemas.openxmlformats.org/drawingml/2006/main" xmlns:r="http://schemas.openxmlformats.org/officeDocument/2006/relationships" xmlns:p="http://schemas.openxmlformats.org/presentationml/2006/main">
   <p:cm authorId="1" dt="2014-08-25T11:42:53.754" idx="2">
@@ -242,7 +271,7 @@
           <a:p>
             <a:fld id="{4031681A-4B84-4DE8-A5EF-A885124D351C}" type="datetimeFigureOut">
               <a:rPr lang="en-US" smtClean="0"/>
-              <a:t>9/11/2022</a:t>
+              <a:t>2/5/2023</a:t>
             </a:fld>
             <a:endParaRPr lang="en-US"/>
           </a:p>
@@ -836,7 +865,7 @@
           <a:p>
             <a:fld id="{DEA2229F-D951-4A8F-BA2A-3B6A0B3F46E2}" type="datetimeFigureOut">
               <a:rPr lang="en-US" smtClean="0"/>
-              <a:t>9/11/2022</a:t>
+              <a:t>2/5/2023</a:t>
             </a:fld>
             <a:endParaRPr lang="en-US"/>
           </a:p>
@@ -1004,7 +1033,7 @@
           <a:p>
             <a:fld id="{DEA2229F-D951-4A8F-BA2A-3B6A0B3F46E2}" type="datetimeFigureOut">
               <a:rPr lang="en-US" smtClean="0"/>
-              <a:t>9/11/2022</a:t>
+              <a:t>2/5/2023</a:t>
             </a:fld>
             <a:endParaRPr lang="en-US"/>
           </a:p>
@@ -1182,7 +1211,7 @@
           <a:p>
             <a:fld id="{DEA2229F-D951-4A8F-BA2A-3B6A0B3F46E2}" type="datetimeFigureOut">
               <a:rPr lang="en-US" smtClean="0"/>
-              <a:t>9/11/2022</a:t>
+              <a:t>2/5/2023</a:t>
             </a:fld>
             <a:endParaRPr lang="en-US"/>
           </a:p>
@@ -1638,7 +1667,7 @@
           <a:p>
             <a:fld id="{DEA2229F-D951-4A8F-BA2A-3B6A0B3F46E2}" type="datetimeFigureOut">
               <a:rPr lang="en-US" smtClean="0"/>
-              <a:t>9/11/2022</a:t>
+              <a:t>2/5/2023</a:t>
             </a:fld>
             <a:endParaRPr lang="en-US"/>
           </a:p>
@@ -1883,7 +1912,7 @@
           <a:p>
             <a:fld id="{DEA2229F-D951-4A8F-BA2A-3B6A0B3F46E2}" type="datetimeFigureOut">
               <a:rPr lang="en-US" smtClean="0"/>
-              <a:t>9/11/2022</a:t>
+              <a:t>2/5/2023</a:t>
             </a:fld>
             <a:endParaRPr lang="en-US"/>
           </a:p>
@@ -2112,7 +2141,7 @@
           <a:p>
             <a:fld id="{DEA2229F-D951-4A8F-BA2A-3B6A0B3F46E2}" type="datetimeFigureOut">
               <a:rPr lang="en-US" smtClean="0"/>
-              <a:t>9/11/2022</a:t>
+              <a:t>2/5/2023</a:t>
             </a:fld>
             <a:endParaRPr lang="en-US"/>
           </a:p>
@@ -2476,7 +2505,7 @@
           <a:p>
             <a:fld id="{DEA2229F-D951-4A8F-BA2A-3B6A0B3F46E2}" type="datetimeFigureOut">
               <a:rPr lang="en-US" smtClean="0"/>
-              <a:t>9/11/2022</a:t>
+              <a:t>2/5/2023</a:t>
             </a:fld>
             <a:endParaRPr lang="en-US"/>
           </a:p>
@@ -2593,7 +2622,7 @@
           <a:p>
             <a:fld id="{DEA2229F-D951-4A8F-BA2A-3B6A0B3F46E2}" type="datetimeFigureOut">
               <a:rPr lang="en-US" smtClean="0"/>
-              <a:t>9/11/2022</a:t>
+              <a:t>2/5/2023</a:t>
             </a:fld>
             <a:endParaRPr lang="en-US"/>
           </a:p>
@@ -2688,7 +2717,7 @@
           <a:p>
             <a:fld id="{DEA2229F-D951-4A8F-BA2A-3B6A0B3F46E2}" type="datetimeFigureOut">
               <a:rPr lang="en-US" smtClean="0"/>
-              <a:t>9/11/2022</a:t>
+              <a:t>2/5/2023</a:t>
             </a:fld>
             <a:endParaRPr lang="en-US"/>
           </a:p>
@@ -2963,7 +2992,7 @@
           <a:p>
             <a:fld id="{DEA2229F-D951-4A8F-BA2A-3B6A0B3F46E2}" type="datetimeFigureOut">
               <a:rPr lang="en-US" smtClean="0"/>
-              <a:t>9/11/2022</a:t>
+              <a:t>2/5/2023</a:t>
             </a:fld>
             <a:endParaRPr lang="en-US"/>
           </a:p>
@@ -3215,7 +3244,7 @@
           <a:p>
             <a:fld id="{DEA2229F-D951-4A8F-BA2A-3B6A0B3F46E2}" type="datetimeFigureOut">
               <a:rPr lang="en-US" smtClean="0"/>
-              <a:t>9/11/2022</a:t>
+              <a:t>2/5/2023</a:t>
             </a:fld>
             <a:endParaRPr lang="en-US"/>
           </a:p>
@@ -3426,7 +3455,7 @@
           <a:p>
             <a:fld id="{DEA2229F-D951-4A8F-BA2A-3B6A0B3F46E2}" type="datetimeFigureOut">
               <a:rPr lang="en-US" smtClean="0"/>
-              <a:t>9/11/2022</a:t>
+              <a:t>2/5/2023</a:t>
             </a:fld>
             <a:endParaRPr lang="en-US"/>
           </a:p>
@@ -3907,8 +3936,12 @@
           <a:lstStyle/>
           <a:p>
             <a:r>
+              <a:rPr lang="en-US"/>
+              <a:t>February 7th</a:t>
+            </a:r>
+            <a:r>
               <a:rPr lang="en-US" dirty="0"/>
-              <a:t>September 13th, 2022</a:t>
+              <a:t>, 2023</a:t>
             </a:r>
           </a:p>
         </p:txBody>
@@ -7293,4 +7326,10 @@
     </a:ext>
   </a:extLst>
 </a:theme>
+</file>
+
+<file path=docMetadata/LabelInfo.xml><?xml version="1.0" encoding="utf-8"?>
+<clbl:labelList xmlns:clbl="http://schemas.microsoft.com/office/2020/mipLabelMetadata">
+  <clbl:label id="{b1851626-05c4-426e-b768-1c35733f6fea}" enabled="1" method="Standard" siteId="{fbc493a8-0d24-4454-a815-f4ca58e8c09d}" removed="0"/>
+</clbl:labelList>
 </file>
</xml_diff>

<commit_message>
PHSA_CD March 2023 Updates
</commit_message>
<xml_diff>
--- a/SMART on FHIR Primer.pptx
+++ b/SMART on FHIR Primer.pptx
@@ -177,6 +177,30 @@
       </pc:sldChg>
     </pc:docChg>
   </pc:docChgLst>
+  <pc:docChgLst>
+    <pc:chgData name="Heits, Brian" userId="4566fefd-61b7-4c5a-b683-1c8fdafc2832" providerId="ADAL" clId="{F0E377DA-DFD7-4F13-941F-429FCB9CC344}"/>
+    <pc:docChg chg="modSld">
+      <pc:chgData name="Heits, Brian" userId="4566fefd-61b7-4c5a-b683-1c8fdafc2832" providerId="ADAL" clId="{F0E377DA-DFD7-4F13-941F-429FCB9CC344}" dt="2023-03-19T21:53:08.423" v="13" actId="20577"/>
+      <pc:docMkLst>
+        <pc:docMk/>
+      </pc:docMkLst>
+      <pc:sldChg chg="modSp mod">
+        <pc:chgData name="Heits, Brian" userId="4566fefd-61b7-4c5a-b683-1c8fdafc2832" providerId="ADAL" clId="{F0E377DA-DFD7-4F13-941F-429FCB9CC344}" dt="2023-03-19T21:53:08.423" v="13" actId="20577"/>
+        <pc:sldMkLst>
+          <pc:docMk/>
+          <pc:sldMk cId="579498076" sldId="317"/>
+        </pc:sldMkLst>
+        <pc:spChg chg="mod">
+          <ac:chgData name="Heits, Brian" userId="4566fefd-61b7-4c5a-b683-1c8fdafc2832" providerId="ADAL" clId="{F0E377DA-DFD7-4F13-941F-429FCB9CC344}" dt="2023-03-19T21:53:08.423" v="13" actId="20577"/>
+          <ac:spMkLst>
+            <pc:docMk/>
+            <pc:sldMk cId="579498076" sldId="317"/>
+            <ac:spMk id="4" creationId="{00000000-0000-0000-0000-000000000000}"/>
+          </ac:spMkLst>
+        </pc:spChg>
+      </pc:sldChg>
+    </pc:docChg>
+  </pc:docChgLst>
 </pc:chgInfo>
 </file>
 
@@ -271,7 +295,7 @@
           <a:p>
             <a:fld id="{4031681A-4B84-4DE8-A5EF-A885124D351C}" type="datetimeFigureOut">
               <a:rPr lang="en-US" smtClean="0"/>
-              <a:t>2/5/2023</a:t>
+              <a:t>3/19/2023</a:t>
             </a:fld>
             <a:endParaRPr lang="en-US"/>
           </a:p>
@@ -865,7 +889,7 @@
           <a:p>
             <a:fld id="{DEA2229F-D951-4A8F-BA2A-3B6A0B3F46E2}" type="datetimeFigureOut">
               <a:rPr lang="en-US" smtClean="0"/>
-              <a:t>2/5/2023</a:t>
+              <a:t>3/19/2023</a:t>
             </a:fld>
             <a:endParaRPr lang="en-US"/>
           </a:p>
@@ -1033,7 +1057,7 @@
           <a:p>
             <a:fld id="{DEA2229F-D951-4A8F-BA2A-3B6A0B3F46E2}" type="datetimeFigureOut">
               <a:rPr lang="en-US" smtClean="0"/>
-              <a:t>2/5/2023</a:t>
+              <a:t>3/19/2023</a:t>
             </a:fld>
             <a:endParaRPr lang="en-US"/>
           </a:p>
@@ -1211,7 +1235,7 @@
           <a:p>
             <a:fld id="{DEA2229F-D951-4A8F-BA2A-3B6A0B3F46E2}" type="datetimeFigureOut">
               <a:rPr lang="en-US" smtClean="0"/>
-              <a:t>2/5/2023</a:t>
+              <a:t>3/19/2023</a:t>
             </a:fld>
             <a:endParaRPr lang="en-US"/>
           </a:p>
@@ -1667,7 +1691,7 @@
           <a:p>
             <a:fld id="{DEA2229F-D951-4A8F-BA2A-3B6A0B3F46E2}" type="datetimeFigureOut">
               <a:rPr lang="en-US" smtClean="0"/>
-              <a:t>2/5/2023</a:t>
+              <a:t>3/19/2023</a:t>
             </a:fld>
             <a:endParaRPr lang="en-US"/>
           </a:p>
@@ -1912,7 +1936,7 @@
           <a:p>
             <a:fld id="{DEA2229F-D951-4A8F-BA2A-3B6A0B3F46E2}" type="datetimeFigureOut">
               <a:rPr lang="en-US" smtClean="0"/>
-              <a:t>2/5/2023</a:t>
+              <a:t>3/19/2023</a:t>
             </a:fld>
             <a:endParaRPr lang="en-US"/>
           </a:p>
@@ -2141,7 +2165,7 @@
           <a:p>
             <a:fld id="{DEA2229F-D951-4A8F-BA2A-3B6A0B3F46E2}" type="datetimeFigureOut">
               <a:rPr lang="en-US" smtClean="0"/>
-              <a:t>2/5/2023</a:t>
+              <a:t>3/19/2023</a:t>
             </a:fld>
             <a:endParaRPr lang="en-US"/>
           </a:p>
@@ -2505,7 +2529,7 @@
           <a:p>
             <a:fld id="{DEA2229F-D951-4A8F-BA2A-3B6A0B3F46E2}" type="datetimeFigureOut">
               <a:rPr lang="en-US" smtClean="0"/>
-              <a:t>2/5/2023</a:t>
+              <a:t>3/19/2023</a:t>
             </a:fld>
             <a:endParaRPr lang="en-US"/>
           </a:p>
@@ -2622,7 +2646,7 @@
           <a:p>
             <a:fld id="{DEA2229F-D951-4A8F-BA2A-3B6A0B3F46E2}" type="datetimeFigureOut">
               <a:rPr lang="en-US" smtClean="0"/>
-              <a:t>2/5/2023</a:t>
+              <a:t>3/19/2023</a:t>
             </a:fld>
             <a:endParaRPr lang="en-US"/>
           </a:p>
@@ -2717,7 +2741,7 @@
           <a:p>
             <a:fld id="{DEA2229F-D951-4A8F-BA2A-3B6A0B3F46E2}" type="datetimeFigureOut">
               <a:rPr lang="en-US" smtClean="0"/>
-              <a:t>2/5/2023</a:t>
+              <a:t>3/19/2023</a:t>
             </a:fld>
             <a:endParaRPr lang="en-US"/>
           </a:p>
@@ -2992,7 +3016,7 @@
           <a:p>
             <a:fld id="{DEA2229F-D951-4A8F-BA2A-3B6A0B3F46E2}" type="datetimeFigureOut">
               <a:rPr lang="en-US" smtClean="0"/>
-              <a:t>2/5/2023</a:t>
+              <a:t>3/19/2023</a:t>
             </a:fld>
             <a:endParaRPr lang="en-US"/>
           </a:p>
@@ -3244,7 +3268,7 @@
           <a:p>
             <a:fld id="{DEA2229F-D951-4A8F-BA2A-3B6A0B3F46E2}" type="datetimeFigureOut">
               <a:rPr lang="en-US" smtClean="0"/>
-              <a:t>2/5/2023</a:t>
+              <a:t>3/19/2023</a:t>
             </a:fld>
             <a:endParaRPr lang="en-US"/>
           </a:p>
@@ -3455,7 +3479,7 @@
           <a:p>
             <a:fld id="{DEA2229F-D951-4A8F-BA2A-3B6A0B3F46E2}" type="datetimeFigureOut">
               <a:rPr lang="en-US" smtClean="0"/>
-              <a:t>2/5/2023</a:t>
+              <a:t>3/19/2023</a:t>
             </a:fld>
             <a:endParaRPr lang="en-US"/>
           </a:p>
@@ -3937,11 +3961,19 @@
           <a:p>
             <a:r>
               <a:rPr lang="en-US"/>
-              <a:t>February 7th</a:t>
+              <a:t>21</a:t>
+            </a:r>
+            <a:r>
+              <a:rPr lang="en-US" baseline="30000"/>
+              <a:t>st</a:t>
+            </a:r>
+            <a:r>
+              <a:rPr lang="en-US"/>
+              <a:t> of March, </a:t>
             </a:r>
             <a:r>
               <a:rPr lang="en-US" dirty="0"/>
-              <a:t>, 2023</a:t>
+              <a:t>2023</a:t>
             </a:r>
           </a:p>
         </p:txBody>

</xml_diff>

<commit_message>
Update December 2023 (v2)
</commit_message>
<xml_diff>
--- a/SMART on FHIR Primer.pptx
+++ b/SMART on FHIR Primer.pptx
@@ -180,12 +180,12 @@
   <pc:docChgLst>
     <pc:chgData name="Heits, Brian" userId="4566fefd-61b7-4c5a-b683-1c8fdafc2832" providerId="ADAL" clId="{6861493C-8A7A-455C-BCE0-E455F0A71708}"/>
     <pc:docChg chg="undo custSel modSld">
-      <pc:chgData name="Heits, Brian" userId="4566fefd-61b7-4c5a-b683-1c8fdafc2832" providerId="ADAL" clId="{6861493C-8A7A-455C-BCE0-E455F0A71708}" dt="2023-12-04T01:02:15.549" v="44" actId="20577"/>
+      <pc:chgData name="Heits, Brian" userId="4566fefd-61b7-4c5a-b683-1c8fdafc2832" providerId="ADAL" clId="{6861493C-8A7A-455C-BCE0-E455F0A71708}" dt="2023-12-11T03:23:49.972" v="51" actId="20577"/>
       <pc:docMkLst>
         <pc:docMk/>
       </pc:docMkLst>
       <pc:sldChg chg="modSp mod">
-        <pc:chgData name="Heits, Brian" userId="4566fefd-61b7-4c5a-b683-1c8fdafc2832" providerId="ADAL" clId="{6861493C-8A7A-455C-BCE0-E455F0A71708}" dt="2023-12-04T01:02:15.549" v="44" actId="20577"/>
+        <pc:chgData name="Heits, Brian" userId="4566fefd-61b7-4c5a-b683-1c8fdafc2832" providerId="ADAL" clId="{6861493C-8A7A-455C-BCE0-E455F0A71708}" dt="2023-12-11T03:23:49.972" v="51" actId="20577"/>
         <pc:sldMkLst>
           <pc:docMk/>
           <pc:sldMk cId="579498076" sldId="317"/>
@@ -199,7 +199,7 @@
           </ac:spMkLst>
         </pc:spChg>
         <pc:spChg chg="mod">
-          <ac:chgData name="Heits, Brian" userId="4566fefd-61b7-4c5a-b683-1c8fdafc2832" providerId="ADAL" clId="{6861493C-8A7A-455C-BCE0-E455F0A71708}" dt="2023-12-04T01:01:59.346" v="24" actId="20577"/>
+          <ac:chgData name="Heits, Brian" userId="4566fefd-61b7-4c5a-b683-1c8fdafc2832" providerId="ADAL" clId="{6861493C-8A7A-455C-BCE0-E455F0A71708}" dt="2023-12-11T03:23:49.972" v="51" actId="20577"/>
           <ac:spMkLst>
             <pc:docMk/>
             <pc:sldMk cId="579498076" sldId="317"/>
@@ -327,7 +327,7 @@
           <a:p>
             <a:fld id="{4031681A-4B84-4DE8-A5EF-A885124D351C}" type="datetimeFigureOut">
               <a:rPr lang="en-US" smtClean="0"/>
-              <a:t>12/3/2023</a:t>
+              <a:t>12/10/2023</a:t>
             </a:fld>
             <a:endParaRPr lang="en-US"/>
           </a:p>
@@ -921,7 +921,7 @@
           <a:p>
             <a:fld id="{DEA2229F-D951-4A8F-BA2A-3B6A0B3F46E2}" type="datetimeFigureOut">
               <a:rPr lang="en-US" smtClean="0"/>
-              <a:t>12/3/2023</a:t>
+              <a:t>12/10/2023</a:t>
             </a:fld>
             <a:endParaRPr lang="en-US"/>
           </a:p>
@@ -1089,7 +1089,7 @@
           <a:p>
             <a:fld id="{DEA2229F-D951-4A8F-BA2A-3B6A0B3F46E2}" type="datetimeFigureOut">
               <a:rPr lang="en-US" smtClean="0"/>
-              <a:t>12/3/2023</a:t>
+              <a:t>12/10/2023</a:t>
             </a:fld>
             <a:endParaRPr lang="en-US"/>
           </a:p>
@@ -1267,7 +1267,7 @@
           <a:p>
             <a:fld id="{DEA2229F-D951-4A8F-BA2A-3B6A0B3F46E2}" type="datetimeFigureOut">
               <a:rPr lang="en-US" smtClean="0"/>
-              <a:t>12/3/2023</a:t>
+              <a:t>12/10/2023</a:t>
             </a:fld>
             <a:endParaRPr lang="en-US"/>
           </a:p>
@@ -1723,7 +1723,7 @@
           <a:p>
             <a:fld id="{DEA2229F-D951-4A8F-BA2A-3B6A0B3F46E2}" type="datetimeFigureOut">
               <a:rPr lang="en-US" smtClean="0"/>
-              <a:t>12/3/2023</a:t>
+              <a:t>12/10/2023</a:t>
             </a:fld>
             <a:endParaRPr lang="en-US"/>
           </a:p>
@@ -1968,7 +1968,7 @@
           <a:p>
             <a:fld id="{DEA2229F-D951-4A8F-BA2A-3B6A0B3F46E2}" type="datetimeFigureOut">
               <a:rPr lang="en-US" smtClean="0"/>
-              <a:t>12/3/2023</a:t>
+              <a:t>12/10/2023</a:t>
             </a:fld>
             <a:endParaRPr lang="en-US"/>
           </a:p>
@@ -2197,7 +2197,7 @@
           <a:p>
             <a:fld id="{DEA2229F-D951-4A8F-BA2A-3B6A0B3F46E2}" type="datetimeFigureOut">
               <a:rPr lang="en-US" smtClean="0"/>
-              <a:t>12/3/2023</a:t>
+              <a:t>12/10/2023</a:t>
             </a:fld>
             <a:endParaRPr lang="en-US"/>
           </a:p>
@@ -2561,7 +2561,7 @@
           <a:p>
             <a:fld id="{DEA2229F-D951-4A8F-BA2A-3B6A0B3F46E2}" type="datetimeFigureOut">
               <a:rPr lang="en-US" smtClean="0"/>
-              <a:t>12/3/2023</a:t>
+              <a:t>12/10/2023</a:t>
             </a:fld>
             <a:endParaRPr lang="en-US"/>
           </a:p>
@@ -2678,7 +2678,7 @@
           <a:p>
             <a:fld id="{DEA2229F-D951-4A8F-BA2A-3B6A0B3F46E2}" type="datetimeFigureOut">
               <a:rPr lang="en-US" smtClean="0"/>
-              <a:t>12/3/2023</a:t>
+              <a:t>12/10/2023</a:t>
             </a:fld>
             <a:endParaRPr lang="en-US"/>
           </a:p>
@@ -2773,7 +2773,7 @@
           <a:p>
             <a:fld id="{DEA2229F-D951-4A8F-BA2A-3B6A0B3F46E2}" type="datetimeFigureOut">
               <a:rPr lang="en-US" smtClean="0"/>
-              <a:t>12/3/2023</a:t>
+              <a:t>12/10/2023</a:t>
             </a:fld>
             <a:endParaRPr lang="en-US"/>
           </a:p>
@@ -3048,7 +3048,7 @@
           <a:p>
             <a:fld id="{DEA2229F-D951-4A8F-BA2A-3B6A0B3F46E2}" type="datetimeFigureOut">
               <a:rPr lang="en-US" smtClean="0"/>
-              <a:t>12/3/2023</a:t>
+              <a:t>12/10/2023</a:t>
             </a:fld>
             <a:endParaRPr lang="en-US"/>
           </a:p>
@@ -3300,7 +3300,7 @@
           <a:p>
             <a:fld id="{DEA2229F-D951-4A8F-BA2A-3B6A0B3F46E2}" type="datetimeFigureOut">
               <a:rPr lang="en-US" smtClean="0"/>
-              <a:t>12/3/2023</a:t>
+              <a:t>12/10/2023</a:t>
             </a:fld>
             <a:endParaRPr lang="en-US"/>
           </a:p>
@@ -3511,7 +3511,7 @@
           <a:p>
             <a:fld id="{DEA2229F-D951-4A8F-BA2A-3B6A0B3F46E2}" type="datetimeFigureOut">
               <a:rPr lang="en-US" smtClean="0"/>
-              <a:t>12/3/2023</a:t>
+              <a:t>12/10/2023</a:t>
             </a:fld>
             <a:endParaRPr lang="en-US"/>
           </a:p>
@@ -3993,7 +3993,7 @@
           <a:p>
             <a:r>
               <a:rPr lang="en-US" dirty="0"/>
-              <a:t>5</a:t>
+              <a:t>12</a:t>
             </a:r>
             <a:r>
               <a:rPr lang="en-US" baseline="30000" dirty="0"/>

</xml_diff>

<commit_message>
December 2025 Update - IMED_AE Training
</commit_message>
<xml_diff>
--- a/SMART on FHIR Primer.pptx
+++ b/SMART on FHIR Primer.pptx
@@ -327,7 +327,7 @@
           <a:p>
             <a:fld id="{4031681A-4B84-4DE8-A5EF-A885124D351C}" type="datetimeFigureOut">
               <a:rPr lang="en-US" smtClean="0"/>
-              <a:t>8/25/2025</a:t>
+              <a:t>12/13/2025</a:t>
             </a:fld>
             <a:endParaRPr lang="en-US"/>
           </a:p>
@@ -921,7 +921,7 @@
           <a:p>
             <a:fld id="{DEA2229F-D951-4A8F-BA2A-3B6A0B3F46E2}" type="datetimeFigureOut">
               <a:rPr lang="en-US" smtClean="0"/>
-              <a:t>8/25/2025</a:t>
+              <a:t>12/13/2025</a:t>
             </a:fld>
             <a:endParaRPr lang="en-US"/>
           </a:p>
@@ -1089,7 +1089,7 @@
           <a:p>
             <a:fld id="{DEA2229F-D951-4A8F-BA2A-3B6A0B3F46E2}" type="datetimeFigureOut">
               <a:rPr lang="en-US" smtClean="0"/>
-              <a:t>8/25/2025</a:t>
+              <a:t>12/13/2025</a:t>
             </a:fld>
             <a:endParaRPr lang="en-US"/>
           </a:p>
@@ -1267,7 +1267,7 @@
           <a:p>
             <a:fld id="{DEA2229F-D951-4A8F-BA2A-3B6A0B3F46E2}" type="datetimeFigureOut">
               <a:rPr lang="en-US" smtClean="0"/>
-              <a:t>8/25/2025</a:t>
+              <a:t>12/13/2025</a:t>
             </a:fld>
             <a:endParaRPr lang="en-US"/>
           </a:p>
@@ -1723,7 +1723,7 @@
           <a:p>
             <a:fld id="{DEA2229F-D951-4A8F-BA2A-3B6A0B3F46E2}" type="datetimeFigureOut">
               <a:rPr lang="en-US" smtClean="0"/>
-              <a:t>8/25/2025</a:t>
+              <a:t>12/13/2025</a:t>
             </a:fld>
             <a:endParaRPr lang="en-US"/>
           </a:p>
@@ -1968,7 +1968,7 @@
           <a:p>
             <a:fld id="{DEA2229F-D951-4A8F-BA2A-3B6A0B3F46E2}" type="datetimeFigureOut">
               <a:rPr lang="en-US" smtClean="0"/>
-              <a:t>8/25/2025</a:t>
+              <a:t>12/13/2025</a:t>
             </a:fld>
             <a:endParaRPr lang="en-US"/>
           </a:p>
@@ -2197,7 +2197,7 @@
           <a:p>
             <a:fld id="{DEA2229F-D951-4A8F-BA2A-3B6A0B3F46E2}" type="datetimeFigureOut">
               <a:rPr lang="en-US" smtClean="0"/>
-              <a:t>8/25/2025</a:t>
+              <a:t>12/13/2025</a:t>
             </a:fld>
             <a:endParaRPr lang="en-US"/>
           </a:p>
@@ -2561,7 +2561,7 @@
           <a:p>
             <a:fld id="{DEA2229F-D951-4A8F-BA2A-3B6A0B3F46E2}" type="datetimeFigureOut">
               <a:rPr lang="en-US" smtClean="0"/>
-              <a:t>8/25/2025</a:t>
+              <a:t>12/13/2025</a:t>
             </a:fld>
             <a:endParaRPr lang="en-US"/>
           </a:p>
@@ -2678,7 +2678,7 @@
           <a:p>
             <a:fld id="{DEA2229F-D951-4A8F-BA2A-3B6A0B3F46E2}" type="datetimeFigureOut">
               <a:rPr lang="en-US" smtClean="0"/>
-              <a:t>8/25/2025</a:t>
+              <a:t>12/13/2025</a:t>
             </a:fld>
             <a:endParaRPr lang="en-US"/>
           </a:p>
@@ -2773,7 +2773,7 @@
           <a:p>
             <a:fld id="{DEA2229F-D951-4A8F-BA2A-3B6A0B3F46E2}" type="datetimeFigureOut">
               <a:rPr lang="en-US" smtClean="0"/>
-              <a:t>8/25/2025</a:t>
+              <a:t>12/13/2025</a:t>
             </a:fld>
             <a:endParaRPr lang="en-US"/>
           </a:p>
@@ -3048,7 +3048,7 @@
           <a:p>
             <a:fld id="{DEA2229F-D951-4A8F-BA2A-3B6A0B3F46E2}" type="datetimeFigureOut">
               <a:rPr lang="en-US" smtClean="0"/>
-              <a:t>8/25/2025</a:t>
+              <a:t>12/13/2025</a:t>
             </a:fld>
             <a:endParaRPr lang="en-US"/>
           </a:p>
@@ -3300,7 +3300,7 @@
           <a:p>
             <a:fld id="{DEA2229F-D951-4A8F-BA2A-3B6A0B3F46E2}" type="datetimeFigureOut">
               <a:rPr lang="en-US" smtClean="0"/>
-              <a:t>8/25/2025</a:t>
+              <a:t>12/13/2025</a:t>
             </a:fld>
             <a:endParaRPr lang="en-US"/>
           </a:p>
@@ -3511,7 +3511,7 @@
           <a:p>
             <a:fld id="{DEA2229F-D951-4A8F-BA2A-3B6A0B3F46E2}" type="datetimeFigureOut">
               <a:rPr lang="en-US" smtClean="0"/>
-              <a:t>8/25/2025</a:t>
+              <a:t>12/13/2025</a:t>
             </a:fld>
             <a:endParaRPr lang="en-US"/>
           </a:p>
@@ -4089,7 +4089,7 @@
           <a:p>
             <a:r>
               <a:rPr lang="en-US" dirty="0"/>
-              <a:t>27</a:t>
+              <a:t>16</a:t>
             </a:r>
             <a:r>
               <a:rPr lang="en-US" baseline="30000" dirty="0"/>
@@ -4097,7 +4097,7 @@
             </a:r>
             <a:r>
               <a:rPr lang="en-US" dirty="0"/>
-              <a:t> of August, 2025</a:t>
+              <a:t> of December, 2025</a:t>
             </a:r>
           </a:p>
         </p:txBody>
@@ -7486,6 +7486,7 @@
 
 <file path=docMetadata/LabelInfo.xml><?xml version="1.0" encoding="utf-8"?>
 <clbl:labelList xmlns:clbl="http://schemas.microsoft.com/office/2020/mipLabelMetadata">
+  <clbl:label id="{56665055-977f-4acd-9884-1bec8e5ad200}" enabled="1" method="Standard" siteId="{4e2c6054-71cb-48f1-bd6c-3a9705aca71b}" contentBits="3" removed="0"/>
   <clbl:label id="{b1851626-05c4-426e-b768-1c35733f6fea}" enabled="1" method="Standard" siteId="{fbc493a8-0d24-4454-a815-f4ca58e8c09d}" removed="0"/>
 </clbl:labelList>
 </file>
</xml_diff>